<commit_message>
28 -> Page Encoding -> UTF-8 Change
</commit_message>
<xml_diff>
--- a/14110080_JSP_Project.pptx
+++ b/14110080_JSP_Project.pptx
@@ -20,34 +20,34 @@
   <p:notesSz cx="6858000" cy="9144000"/>
   <p:embeddedFontLst>
     <p:embeddedFont>
-      <p:font typeface="-윤고딕330" panose="020B0600000101010101" charset="-127"/>
-      <p:regular r:id="rId10"/>
+      <p:font typeface="Arial Black" panose="020B0A04020102020204" pitchFamily="34" charset="0"/>
+      <p:bold r:id="rId10"/>
+    </p:embeddedFont>
+    <p:embeddedFont>
+      <p:font typeface="나눔바른고딕" panose="020B0600000101010101" charset="-127"/>
+      <p:regular r:id="rId11"/>
+      <p:bold r:id="rId12"/>
     </p:embeddedFont>
     <p:embeddedFont>
       <p:font typeface="Calibri Light" panose="020F0302020204030204" pitchFamily="34" charset="0"/>
-      <p:regular r:id="rId11"/>
-      <p:italic r:id="rId12"/>
+      <p:regular r:id="rId13"/>
+      <p:italic r:id="rId14"/>
     </p:embeddedFont>
     <p:embeddedFont>
       <p:font typeface="Calibri" panose="020F0502020204030204" pitchFamily="34" charset="0"/>
-      <p:regular r:id="rId13"/>
-      <p:bold r:id="rId14"/>
-      <p:italic r:id="rId15"/>
-      <p:boldItalic r:id="rId16"/>
+      <p:regular r:id="rId15"/>
+      <p:bold r:id="rId16"/>
+      <p:italic r:id="rId17"/>
+      <p:boldItalic r:id="rId18"/>
     </p:embeddedFont>
     <p:embeddedFont>
       <p:font typeface="맑은 고딕" panose="020B0503020000020004" pitchFamily="50" charset="-127"/>
-      <p:regular r:id="rId17"/>
-      <p:bold r:id="rId18"/>
-    </p:embeddedFont>
-    <p:embeddedFont>
-      <p:font typeface="나눔바른고딕" panose="020B0600000101010101" charset="-127"/>
       <p:regular r:id="rId19"/>
       <p:bold r:id="rId20"/>
     </p:embeddedFont>
     <p:embeddedFont>
-      <p:font typeface="Arial Black" panose="020B0A04020102020204" pitchFamily="34" charset="0"/>
-      <p:bold r:id="rId21"/>
+      <p:font typeface="-윤고딕330" panose="020B0600000101010101" charset="-127"/>
+      <p:regular r:id="rId21"/>
     </p:embeddedFont>
   </p:embeddedFontLst>
   <p:defaultTextStyle>
@@ -246,7 +246,7 @@
           <a:p>
             <a:fld id="{7269368D-9F6A-4AE3-A5E5-E4B0195D3AD8}" type="datetimeFigureOut">
               <a:rPr lang="ko-KR" altLang="en-US" smtClean="0"/>
-              <a:t>2019-06-16</a:t>
+              <a:t>2019-06-17</a:t>
             </a:fld>
             <a:endParaRPr lang="ko-KR" altLang="en-US"/>
           </a:p>
@@ -1149,7 +1149,7 @@
           <a:p>
             <a:fld id="{FF54B933-3EF7-4CC7-AA26-D78F941C1A1E}" type="datetimeFigureOut">
               <a:rPr lang="ko-KR" altLang="en-US" smtClean="0"/>
-              <a:t>2019-06-16</a:t>
+              <a:t>2019-06-17</a:t>
             </a:fld>
             <a:endParaRPr lang="ko-KR" altLang="en-US"/>
           </a:p>
@@ -1319,7 +1319,7 @@
           <a:p>
             <a:fld id="{FF54B933-3EF7-4CC7-AA26-D78F941C1A1E}" type="datetimeFigureOut">
               <a:rPr lang="ko-KR" altLang="en-US" smtClean="0"/>
-              <a:t>2019-06-16</a:t>
+              <a:t>2019-06-17</a:t>
             </a:fld>
             <a:endParaRPr lang="ko-KR" altLang="en-US"/>
           </a:p>
@@ -1499,7 +1499,7 @@
           <a:p>
             <a:fld id="{FF54B933-3EF7-4CC7-AA26-D78F941C1A1E}" type="datetimeFigureOut">
               <a:rPr lang="ko-KR" altLang="en-US" smtClean="0"/>
-              <a:t>2019-06-16</a:t>
+              <a:t>2019-06-17</a:t>
             </a:fld>
             <a:endParaRPr lang="ko-KR" altLang="en-US"/>
           </a:p>
@@ -1669,7 +1669,7 @@
           <a:p>
             <a:fld id="{FF54B933-3EF7-4CC7-AA26-D78F941C1A1E}" type="datetimeFigureOut">
               <a:rPr lang="ko-KR" altLang="en-US" smtClean="0"/>
-              <a:t>2019-06-16</a:t>
+              <a:t>2019-06-17</a:t>
             </a:fld>
             <a:endParaRPr lang="ko-KR" altLang="en-US"/>
           </a:p>
@@ -1913,7 +1913,7 @@
           <a:p>
             <a:fld id="{FF54B933-3EF7-4CC7-AA26-D78F941C1A1E}" type="datetimeFigureOut">
               <a:rPr lang="ko-KR" altLang="en-US" smtClean="0"/>
-              <a:t>2019-06-16</a:t>
+              <a:t>2019-06-17</a:t>
             </a:fld>
             <a:endParaRPr lang="ko-KR" altLang="en-US"/>
           </a:p>
@@ -2145,7 +2145,7 @@
           <a:p>
             <a:fld id="{FF54B933-3EF7-4CC7-AA26-D78F941C1A1E}" type="datetimeFigureOut">
               <a:rPr lang="ko-KR" altLang="en-US" smtClean="0"/>
-              <a:t>2019-06-16</a:t>
+              <a:t>2019-06-17</a:t>
             </a:fld>
             <a:endParaRPr lang="ko-KR" altLang="en-US"/>
           </a:p>
@@ -2512,7 +2512,7 @@
           <a:p>
             <a:fld id="{FF54B933-3EF7-4CC7-AA26-D78F941C1A1E}" type="datetimeFigureOut">
               <a:rPr lang="ko-KR" altLang="en-US" smtClean="0"/>
-              <a:t>2019-06-16</a:t>
+              <a:t>2019-06-17</a:t>
             </a:fld>
             <a:endParaRPr lang="ko-KR" altLang="en-US"/>
           </a:p>
@@ -2630,7 +2630,7 @@
           <a:p>
             <a:fld id="{FF54B933-3EF7-4CC7-AA26-D78F941C1A1E}" type="datetimeFigureOut">
               <a:rPr lang="ko-KR" altLang="en-US" smtClean="0"/>
-              <a:t>2019-06-16</a:t>
+              <a:t>2019-06-17</a:t>
             </a:fld>
             <a:endParaRPr lang="ko-KR" altLang="en-US"/>
           </a:p>
@@ -2725,7 +2725,7 @@
           <a:p>
             <a:fld id="{FF54B933-3EF7-4CC7-AA26-D78F941C1A1E}" type="datetimeFigureOut">
               <a:rPr lang="ko-KR" altLang="en-US" smtClean="0"/>
-              <a:t>2019-06-16</a:t>
+              <a:t>2019-06-17</a:t>
             </a:fld>
             <a:endParaRPr lang="ko-KR" altLang="en-US"/>
           </a:p>
@@ -3002,7 +3002,7 @@
           <a:p>
             <a:fld id="{FF54B933-3EF7-4CC7-AA26-D78F941C1A1E}" type="datetimeFigureOut">
               <a:rPr lang="ko-KR" altLang="en-US" smtClean="0"/>
-              <a:t>2019-06-16</a:t>
+              <a:t>2019-06-17</a:t>
             </a:fld>
             <a:endParaRPr lang="ko-KR" altLang="en-US"/>
           </a:p>
@@ -3259,7 +3259,7 @@
           <a:p>
             <a:fld id="{FF54B933-3EF7-4CC7-AA26-D78F941C1A1E}" type="datetimeFigureOut">
               <a:rPr lang="ko-KR" altLang="en-US" smtClean="0"/>
-              <a:t>2019-06-16</a:t>
+              <a:t>2019-06-17</a:t>
             </a:fld>
             <a:endParaRPr lang="ko-KR" altLang="en-US"/>
           </a:p>
@@ -3472,7 +3472,7 @@
           <a:p>
             <a:fld id="{FF54B933-3EF7-4CC7-AA26-D78F941C1A1E}" type="datetimeFigureOut">
               <a:rPr lang="ko-KR" altLang="en-US" smtClean="0"/>
-              <a:t>2019-06-16</a:t>
+              <a:t>2019-06-17</a:t>
             </a:fld>
             <a:endParaRPr lang="ko-KR" altLang="en-US"/>
           </a:p>
@@ -4054,7 +4054,7 @@
         </p:spPr>
         <p:txBody>
           <a:bodyPr>
-            <a:normAutofit lnSpcReduction="10000"/>
+            <a:normAutofit/>
           </a:bodyPr>
           <a:lstStyle/>
           <a:p>
@@ -4541,6 +4541,13 @@
   <p:clrMapOvr>
     <a:masterClrMapping/>
   </p:clrMapOvr>
+  <p:timing>
+    <p:tnLst>
+      <p:par>
+        <p:cTn id="1" dur="indefinite" restart="never" nodeType="tmRoot"/>
+      </p:par>
+    </p:tnLst>
+  </p:timing>
 </p:sld>
 </file>
 
@@ -8720,21 +8727,7 @@
                 <a:latin typeface="나눔바른고딕" panose="020B0603020101020101" pitchFamily="50" charset="-127"/>
                 <a:ea typeface="나눔바른고딕" panose="020B0603020101020101" pitchFamily="50" charset="-127"/>
               </a:rPr>
-              <a:t>4.</a:t>
-            </a:r>
-            <a:r>
-              <a:rPr lang="en-US" altLang="ko-KR" b="1" dirty="0" smtClean="0">
-                <a:ln>
-                  <a:solidFill>
-                    <a:schemeClr val="bg1">
-                      <a:alpha val="0"/>
-                    </a:schemeClr>
-                  </a:solidFill>
-                </a:ln>
-                <a:latin typeface="나눔바른고딕" panose="020B0603020101020101" pitchFamily="50" charset="-127"/>
-                <a:ea typeface="나눔바른고딕" panose="020B0603020101020101" pitchFamily="50" charset="-127"/>
-              </a:rPr>
-              <a:t> </a:t>
+              <a:t>4. </a:t>
             </a:r>
             <a:r>
               <a:rPr lang="ko-KR" altLang="en-US" b="1" dirty="0" smtClean="0">
@@ -9080,160 +9073,6 @@
           </a:p>
         </p:txBody>
       </p:sp>
-      <p:sp>
-        <p:nvSpPr>
-          <p:cNvPr id="26" name="TextBox 25"/>
-          <p:cNvSpPr txBox="1"/>
-          <p:nvPr/>
-        </p:nvSpPr>
-        <p:spPr>
-          <a:xfrm>
-            <a:off x="142844" y="6429396"/>
-            <a:ext cx="4929222" cy="400110"/>
-          </a:xfrm>
-          <a:prstGeom prst="rect">
-            <a:avLst/>
-          </a:prstGeom>
-          <a:noFill/>
-        </p:spPr>
-        <p:txBody>
-          <a:bodyPr wrap="square" rtlCol="0">
-            <a:spAutoFit/>
-          </a:bodyPr>
-          <a:lstStyle/>
-          <a:p>
-            <a:pPr lvl="0" algn="r">
-              <a:spcBef>
-                <a:spcPct val="0"/>
-              </a:spcBef>
-              <a:defRPr/>
-            </a:pPr>
-            <a:r>
-              <a:rPr lang="ko-KR" altLang="en-US" sz="1600" b="1" dirty="0">
-                <a:solidFill>
-                  <a:schemeClr val="bg1">
-                    <a:lumMod val="85000"/>
-                  </a:schemeClr>
-                </a:solidFill>
-                <a:latin typeface="나눔바른고딕" panose="020B0603020101020101" pitchFamily="50" charset="-127"/>
-                <a:ea typeface="나눔바른고딕" panose="020B0603020101020101" pitchFamily="50" charset="-127"/>
-              </a:rPr>
-              <a:t> </a:t>
-            </a:r>
-            <a:r>
-              <a:rPr lang="en-US" altLang="ko-KR" sz="2000" b="1" dirty="0">
-                <a:ln>
-                  <a:solidFill>
-                    <a:schemeClr val="bg1">
-                      <a:alpha val="0"/>
-                    </a:schemeClr>
-                  </a:solidFill>
-                </a:ln>
-                <a:solidFill>
-                  <a:schemeClr val="bg1">
-                    <a:lumMod val="85000"/>
-                  </a:schemeClr>
-                </a:solidFill>
-                <a:latin typeface="나눔바른고딕" panose="020B0603020101020101" pitchFamily="50" charset="-127"/>
-                <a:ea typeface="나눔바른고딕" panose="020B0603020101020101" pitchFamily="50" charset="-127"/>
-              </a:rPr>
-              <a:t>3</a:t>
-            </a:r>
-            <a:r>
-              <a:rPr lang="en-US" altLang="ko-KR" sz="2000" b="1" baseline="30000" dirty="0">
-                <a:ln>
-                  <a:solidFill>
-                    <a:schemeClr val="bg1">
-                      <a:alpha val="0"/>
-                    </a:schemeClr>
-                  </a:solidFill>
-                </a:ln>
-                <a:solidFill>
-                  <a:schemeClr val="bg1">
-                    <a:lumMod val="85000"/>
-                  </a:schemeClr>
-                </a:solidFill>
-                <a:latin typeface="나눔바른고딕" panose="020B0603020101020101" pitchFamily="50" charset="-127"/>
-                <a:ea typeface="나눔바른고딕" panose="020B0603020101020101" pitchFamily="50" charset="-127"/>
-              </a:rPr>
-              <a:t>RD</a:t>
-            </a:r>
-            <a:r>
-              <a:rPr lang="en-US" altLang="ko-KR" sz="2000" b="1" dirty="0">
-                <a:ln>
-                  <a:solidFill>
-                    <a:schemeClr val="bg1">
-                      <a:alpha val="0"/>
-                    </a:schemeClr>
-                  </a:solidFill>
-                </a:ln>
-                <a:solidFill>
-                  <a:schemeClr val="bg1">
-                    <a:lumMod val="85000"/>
-                  </a:schemeClr>
-                </a:solidFill>
-                <a:latin typeface="나눔바른고딕" panose="020B0603020101020101" pitchFamily="50" charset="-127"/>
-                <a:ea typeface="나눔바른고딕" panose="020B0603020101020101" pitchFamily="50" charset="-127"/>
-              </a:rPr>
-              <a:t> </a:t>
-            </a:r>
-            <a:r>
-              <a:rPr lang="ko-KR" altLang="en-US" sz="1400" b="1" dirty="0">
-                <a:ln>
-                  <a:solidFill>
-                    <a:schemeClr val="bg1">
-                      <a:alpha val="0"/>
-                    </a:schemeClr>
-                  </a:solidFill>
-                </a:ln>
-                <a:solidFill>
-                  <a:schemeClr val="bg1">
-                    <a:lumMod val="85000"/>
-                  </a:schemeClr>
-                </a:solidFill>
-                <a:latin typeface="나눔바른고딕" panose="020B0603020101020101" pitchFamily="50" charset="-127"/>
-                <a:ea typeface="나눔바른고딕" panose="020B0603020101020101" pitchFamily="50" charset="-127"/>
-              </a:rPr>
-              <a:t>텍스트를 입력해주세요</a:t>
-            </a:r>
-            <a:r>
-              <a:rPr lang="en-US" altLang="ko-KR" sz="1400" b="1" dirty="0">
-                <a:ln>
-                  <a:solidFill>
-                    <a:schemeClr val="bg1">
-                      <a:alpha val="0"/>
-                    </a:schemeClr>
-                  </a:solidFill>
-                </a:ln>
-                <a:solidFill>
-                  <a:schemeClr val="bg1">
-                    <a:lumMod val="85000"/>
-                  </a:schemeClr>
-                </a:solidFill>
-                <a:latin typeface="나눔바른고딕" panose="020B0603020101020101" pitchFamily="50" charset="-127"/>
-                <a:ea typeface="나눔바른고딕" panose="020B0603020101020101" pitchFamily="50" charset="-127"/>
-              </a:rPr>
-              <a:t>.</a:t>
-            </a:r>
-            <a:endParaRPr lang="ko-KR" altLang="en-US" sz="1400" b="1" dirty="0">
-              <a:ln>
-                <a:solidFill>
-                  <a:schemeClr val="bg1">
-                    <a:alpha val="0"/>
-                  </a:schemeClr>
-                </a:solidFill>
-              </a:ln>
-              <a:solidFill>
-                <a:schemeClr val="bg1">
-                  <a:lumMod val="85000"/>
-                </a:schemeClr>
-              </a:solidFill>
-              <a:latin typeface="나눔바른고딕" panose="020B0603020101020101" pitchFamily="50" charset="-127"/>
-              <a:ea typeface="나눔바른고딕" panose="020B0603020101020101" pitchFamily="50" charset="-127"/>
-            </a:endParaRPr>
-          </a:p>
-        </p:txBody>
-      </p:sp>
       <p:pic>
         <p:nvPicPr>
           <p:cNvPr id="9" name="그림 8"/>
@@ -9518,6 +9357,13 @@
   <p:clrMapOvr>
     <a:masterClrMapping/>
   </p:clrMapOvr>
+  <p:timing>
+    <p:tnLst>
+      <p:par>
+        <p:cTn id="1" dur="indefinite" restart="never" nodeType="tmRoot"/>
+      </p:par>
+    </p:tnLst>
+  </p:timing>
 </p:sld>
 </file>
 
@@ -9951,6 +9797,13 @@
   <p:clrMapOvr>
     <a:masterClrMapping/>
   </p:clrMapOvr>
+  <p:timing>
+    <p:tnLst>
+      <p:par>
+        <p:cTn id="1" dur="indefinite" restart="never" nodeType="tmRoot"/>
+      </p:par>
+    </p:tnLst>
+  </p:timing>
 </p:sld>
 </file>
 

</xml_diff>